<commit_message>
sbiadito un po lo sfondo
se in caso bisognava metterlo sul proiettore non si sarebbe letto niente
</commit_message>
<xml_diff>
--- a/Presentazione GoSoftair/GoSoftair Presentazione.pptx
+++ b/Presentazione GoSoftair/GoSoftair Presentazione.pptx
@@ -110,6 +110,22 @@
       </a:defRPr>
     </a:lvl9pPr>
   </p:defaultTextStyle>
+  <p:extLst>
+    <p:ext uri="{EFAFB233-063F-42B5-8137-9DF3F51BA10A}">
+      <p15:sldGuideLst xmlns:p15="http://schemas.microsoft.com/office/powerpoint/2012/main">
+        <p15:guide id="1" orient="horz" pos="2160">
+          <p15:clr>
+            <a:srgbClr val="A4A3A4"/>
+          </p15:clr>
+        </p15:guide>
+        <p15:guide id="2" pos="2880">
+          <p15:clr>
+            <a:srgbClr val="A4A3A4"/>
+          </p15:clr>
+        </p15:guide>
+      </p15:sldGuideLst>
+    </p:ext>
+  </p:extLst>
 </p:presentation>
 </file>
 
@@ -294,7 +310,7 @@
           <a:p>
             <a:fld id="{8AABD612-701B-044D-B208-0C0A7A9BDE81}" type="datetimeFigureOut">
               <a:rPr lang="it-IT" smtClean="0"/>
-              <a:t>21/09/15</a:t>
+              <a:t>21/09/2015</a:t>
             </a:fld>
             <a:endParaRPr lang="it-IT"/>
           </a:p>
@@ -336,7 +352,7 @@
           <a:p>
             <a:fld id="{E2278B11-66E7-E949-8D09-3B306D4F92B6}" type="slidenum">
               <a:rPr lang="it-IT" smtClean="0"/>
-              <a:t>‹n.›</a:t>
+              <a:t>‹N›</a:t>
             </a:fld>
             <a:endParaRPr lang="it-IT"/>
           </a:p>
@@ -464,7 +480,7 @@
           <a:p>
             <a:fld id="{8AABD612-701B-044D-B208-0C0A7A9BDE81}" type="datetimeFigureOut">
               <a:rPr lang="it-IT" smtClean="0"/>
-              <a:t>21/09/15</a:t>
+              <a:t>21/09/2015</a:t>
             </a:fld>
             <a:endParaRPr lang="it-IT"/>
           </a:p>
@@ -506,7 +522,7 @@
           <a:p>
             <a:fld id="{E2278B11-66E7-E949-8D09-3B306D4F92B6}" type="slidenum">
               <a:rPr lang="it-IT" smtClean="0"/>
-              <a:t>‹n.›</a:t>
+              <a:t>‹N›</a:t>
             </a:fld>
             <a:endParaRPr lang="it-IT"/>
           </a:p>
@@ -644,7 +660,7 @@
           <a:p>
             <a:fld id="{8AABD612-701B-044D-B208-0C0A7A9BDE81}" type="datetimeFigureOut">
               <a:rPr lang="it-IT" smtClean="0"/>
-              <a:t>21/09/15</a:t>
+              <a:t>21/09/2015</a:t>
             </a:fld>
             <a:endParaRPr lang="it-IT"/>
           </a:p>
@@ -686,7 +702,7 @@
           <a:p>
             <a:fld id="{E2278B11-66E7-E949-8D09-3B306D4F92B6}" type="slidenum">
               <a:rPr lang="it-IT" smtClean="0"/>
-              <a:t>‹n.›</a:t>
+              <a:t>‹N›</a:t>
             </a:fld>
             <a:endParaRPr lang="it-IT"/>
           </a:p>
@@ -814,7 +830,7 @@
           <a:p>
             <a:fld id="{8AABD612-701B-044D-B208-0C0A7A9BDE81}" type="datetimeFigureOut">
               <a:rPr lang="it-IT" smtClean="0"/>
-              <a:t>21/09/15</a:t>
+              <a:t>21/09/2015</a:t>
             </a:fld>
             <a:endParaRPr lang="it-IT"/>
           </a:p>
@@ -856,7 +872,7 @@
           <a:p>
             <a:fld id="{E2278B11-66E7-E949-8D09-3B306D4F92B6}" type="slidenum">
               <a:rPr lang="it-IT" smtClean="0"/>
-              <a:t>‹n.›</a:t>
+              <a:t>‹N›</a:t>
             </a:fld>
             <a:endParaRPr lang="it-IT"/>
           </a:p>
@@ -1060,7 +1076,7 @@
           <a:p>
             <a:fld id="{8AABD612-701B-044D-B208-0C0A7A9BDE81}" type="datetimeFigureOut">
               <a:rPr lang="it-IT" smtClean="0"/>
-              <a:t>21/09/15</a:t>
+              <a:t>21/09/2015</a:t>
             </a:fld>
             <a:endParaRPr lang="it-IT"/>
           </a:p>
@@ -1102,7 +1118,7 @@
           <a:p>
             <a:fld id="{E2278B11-66E7-E949-8D09-3B306D4F92B6}" type="slidenum">
               <a:rPr lang="it-IT" smtClean="0"/>
-              <a:t>‹n.›</a:t>
+              <a:t>‹N›</a:t>
             </a:fld>
             <a:endParaRPr lang="it-IT"/>
           </a:p>
@@ -1348,7 +1364,7 @@
           <a:p>
             <a:fld id="{8AABD612-701B-044D-B208-0C0A7A9BDE81}" type="datetimeFigureOut">
               <a:rPr lang="it-IT" smtClean="0"/>
-              <a:t>21/09/15</a:t>
+              <a:t>21/09/2015</a:t>
             </a:fld>
             <a:endParaRPr lang="it-IT"/>
           </a:p>
@@ -1390,7 +1406,7 @@
           <a:p>
             <a:fld id="{E2278B11-66E7-E949-8D09-3B306D4F92B6}" type="slidenum">
               <a:rPr lang="it-IT" smtClean="0"/>
-              <a:t>‹n.›</a:t>
+              <a:t>‹N›</a:t>
             </a:fld>
             <a:endParaRPr lang="it-IT"/>
           </a:p>
@@ -1770,7 +1786,7 @@
           <a:p>
             <a:fld id="{8AABD612-701B-044D-B208-0C0A7A9BDE81}" type="datetimeFigureOut">
               <a:rPr lang="it-IT" smtClean="0"/>
-              <a:t>21/09/15</a:t>
+              <a:t>21/09/2015</a:t>
             </a:fld>
             <a:endParaRPr lang="it-IT"/>
           </a:p>
@@ -1812,7 +1828,7 @@
           <a:p>
             <a:fld id="{E2278B11-66E7-E949-8D09-3B306D4F92B6}" type="slidenum">
               <a:rPr lang="it-IT" smtClean="0"/>
-              <a:t>‹n.›</a:t>
+              <a:t>‹N›</a:t>
             </a:fld>
             <a:endParaRPr lang="it-IT"/>
           </a:p>
@@ -1888,7 +1904,7 @@
           <a:p>
             <a:fld id="{8AABD612-701B-044D-B208-0C0A7A9BDE81}" type="datetimeFigureOut">
               <a:rPr lang="it-IT" smtClean="0"/>
-              <a:t>21/09/15</a:t>
+              <a:t>21/09/2015</a:t>
             </a:fld>
             <a:endParaRPr lang="it-IT"/>
           </a:p>
@@ -1930,7 +1946,7 @@
           <a:p>
             <a:fld id="{E2278B11-66E7-E949-8D09-3B306D4F92B6}" type="slidenum">
               <a:rPr lang="it-IT" smtClean="0"/>
-              <a:t>‹n.›</a:t>
+              <a:t>‹N›</a:t>
             </a:fld>
             <a:endParaRPr lang="it-IT"/>
           </a:p>
@@ -1983,7 +1999,7 @@
           <a:p>
             <a:fld id="{8AABD612-701B-044D-B208-0C0A7A9BDE81}" type="datetimeFigureOut">
               <a:rPr lang="it-IT" smtClean="0"/>
-              <a:t>21/09/15</a:t>
+              <a:t>21/09/2015</a:t>
             </a:fld>
             <a:endParaRPr lang="it-IT"/>
           </a:p>
@@ -2025,7 +2041,7 @@
           <a:p>
             <a:fld id="{E2278B11-66E7-E949-8D09-3B306D4F92B6}" type="slidenum">
               <a:rPr lang="it-IT" smtClean="0"/>
-              <a:t>‹n.›</a:t>
+              <a:t>‹N›</a:t>
             </a:fld>
             <a:endParaRPr lang="it-IT"/>
           </a:p>
@@ -2260,7 +2276,7 @@
           <a:p>
             <a:fld id="{8AABD612-701B-044D-B208-0C0A7A9BDE81}" type="datetimeFigureOut">
               <a:rPr lang="it-IT" smtClean="0"/>
-              <a:t>21/09/15</a:t>
+              <a:t>21/09/2015</a:t>
             </a:fld>
             <a:endParaRPr lang="it-IT"/>
           </a:p>
@@ -2302,7 +2318,7 @@
           <a:p>
             <a:fld id="{E2278B11-66E7-E949-8D09-3B306D4F92B6}" type="slidenum">
               <a:rPr lang="it-IT" smtClean="0"/>
-              <a:t>‹n.›</a:t>
+              <a:t>‹N›</a:t>
             </a:fld>
             <a:endParaRPr lang="it-IT"/>
           </a:p>
@@ -2513,7 +2529,7 @@
           <a:p>
             <a:fld id="{8AABD612-701B-044D-B208-0C0A7A9BDE81}" type="datetimeFigureOut">
               <a:rPr lang="it-IT" smtClean="0"/>
-              <a:t>21/09/15</a:t>
+              <a:t>21/09/2015</a:t>
             </a:fld>
             <a:endParaRPr lang="it-IT"/>
           </a:p>
@@ -2555,7 +2571,7 @@
           <a:p>
             <a:fld id="{E2278B11-66E7-E949-8D09-3B306D4F92B6}" type="slidenum">
               <a:rPr lang="it-IT" smtClean="0"/>
-              <a:t>‹n.›</a:t>
+              <a:t>‹N›</a:t>
             </a:fld>
             <a:endParaRPr lang="it-IT"/>
           </a:p>
@@ -2581,7 +2597,8 @@
       <p:bgPr>
         <a:blipFill dpi="0" rotWithShape="1">
           <a:blip r:embed="rId13">
-            <a:alphaModFix amt="33000"/>
+            <a:alphaModFix amt="19000"/>
+            <a:lum/>
           </a:blip>
           <a:srcRect/>
           <a:stretch>
@@ -2735,7 +2752,7 @@
           <a:p>
             <a:fld id="{8AABD612-701B-044D-B208-0C0A7A9BDE81}" type="datetimeFigureOut">
               <a:rPr lang="it-IT" smtClean="0"/>
-              <a:t>21/09/15</a:t>
+              <a:t>21/09/2015</a:t>
             </a:fld>
             <a:endParaRPr lang="it-IT"/>
           </a:p>
@@ -2813,7 +2830,7 @@
           <a:p>
             <a:fld id="{E2278B11-66E7-E949-8D09-3B306D4F92B6}" type="slidenum">
               <a:rPr lang="it-IT" smtClean="0"/>
-              <a:t>‹n.›</a:t>
+              <a:t>‹N›</a:t>
             </a:fld>
             <a:endParaRPr lang="it-IT"/>
           </a:p>

</xml_diff>